<commit_message>
Multi offscreen texture renders
</commit_message>
<xml_diff>
--- a/6020_Graph_2/D2D/Week_04 (deferred, part 1)/Deferred.pptx
+++ b/6020_Graph_2/D2D/Week_04 (deferred, part 1)/Deferred.pptx
@@ -5,7 +5,7 @@
     <p:sldMasterId id="2147483648" r:id="rId1"/>
   </p:sldMasterIdLst>
   <p:sldIdLst>
-    <p:sldId id="256" r:id="rId2"/>
+    <p:sldId id="261" r:id="rId2"/>
     <p:sldId id="257" r:id="rId3"/>
     <p:sldId id="258" r:id="rId4"/>
     <p:sldId id="259" r:id="rId5"/>
@@ -517,7 +517,7 @@
           <a:p>
             <a:fld id="{6FD62889-B4F9-4BAB-9203-1DBCFD1C949F}" type="datetimeFigureOut">
               <a:rPr lang="en-CA" smtClean="0"/>
-              <a:t>2024-01-25</a:t>
+              <a:t>2024-02-01</a:t>
             </a:fld>
             <a:endParaRPr lang="en-CA"/>
           </a:p>
@@ -717,7 +717,7 @@
           <a:p>
             <a:fld id="{6FD62889-B4F9-4BAB-9203-1DBCFD1C949F}" type="datetimeFigureOut">
               <a:rPr lang="en-CA" smtClean="0"/>
-              <a:t>2024-01-25</a:t>
+              <a:t>2024-02-01</a:t>
             </a:fld>
             <a:endParaRPr lang="en-CA"/>
           </a:p>
@@ -927,7 +927,7 @@
           <a:p>
             <a:fld id="{6FD62889-B4F9-4BAB-9203-1DBCFD1C949F}" type="datetimeFigureOut">
               <a:rPr lang="en-CA" smtClean="0"/>
-              <a:t>2024-01-25</a:t>
+              <a:t>2024-02-01</a:t>
             </a:fld>
             <a:endParaRPr lang="en-CA"/>
           </a:p>
@@ -1127,7 +1127,7 @@
           <a:p>
             <a:fld id="{6FD62889-B4F9-4BAB-9203-1DBCFD1C949F}" type="datetimeFigureOut">
               <a:rPr lang="en-CA" smtClean="0"/>
-              <a:t>2024-01-25</a:t>
+              <a:t>2024-02-01</a:t>
             </a:fld>
             <a:endParaRPr lang="en-CA"/>
           </a:p>
@@ -1403,7 +1403,7 @@
           <a:p>
             <a:fld id="{6FD62889-B4F9-4BAB-9203-1DBCFD1C949F}" type="datetimeFigureOut">
               <a:rPr lang="en-CA" smtClean="0"/>
-              <a:t>2024-01-25</a:t>
+              <a:t>2024-02-01</a:t>
             </a:fld>
             <a:endParaRPr lang="en-CA"/>
           </a:p>
@@ -1671,7 +1671,7 @@
           <a:p>
             <a:fld id="{6FD62889-B4F9-4BAB-9203-1DBCFD1C949F}" type="datetimeFigureOut">
               <a:rPr lang="en-CA" smtClean="0"/>
-              <a:t>2024-01-25</a:t>
+              <a:t>2024-02-01</a:t>
             </a:fld>
             <a:endParaRPr lang="en-CA"/>
           </a:p>
@@ -2086,7 +2086,7 @@
           <a:p>
             <a:fld id="{6FD62889-B4F9-4BAB-9203-1DBCFD1C949F}" type="datetimeFigureOut">
               <a:rPr lang="en-CA" smtClean="0"/>
-              <a:t>2024-01-25</a:t>
+              <a:t>2024-02-01</a:t>
             </a:fld>
             <a:endParaRPr lang="en-CA"/>
           </a:p>
@@ -2228,7 +2228,7 @@
           <a:p>
             <a:fld id="{6FD62889-B4F9-4BAB-9203-1DBCFD1C949F}" type="datetimeFigureOut">
               <a:rPr lang="en-CA" smtClean="0"/>
-              <a:t>2024-01-25</a:t>
+              <a:t>2024-02-01</a:t>
             </a:fld>
             <a:endParaRPr lang="en-CA"/>
           </a:p>
@@ -2341,7 +2341,7 @@
           <a:p>
             <a:fld id="{6FD62889-B4F9-4BAB-9203-1DBCFD1C949F}" type="datetimeFigureOut">
               <a:rPr lang="en-CA" smtClean="0"/>
-              <a:t>2024-01-25</a:t>
+              <a:t>2024-02-01</a:t>
             </a:fld>
             <a:endParaRPr lang="en-CA"/>
           </a:p>
@@ -2654,7 +2654,7 @@
           <a:p>
             <a:fld id="{6FD62889-B4F9-4BAB-9203-1DBCFD1C949F}" type="datetimeFigureOut">
               <a:rPr lang="en-CA" smtClean="0"/>
-              <a:t>2024-01-25</a:t>
+              <a:t>2024-02-01</a:t>
             </a:fld>
             <a:endParaRPr lang="en-CA"/>
           </a:p>
@@ -2943,7 +2943,7 @@
           <a:p>
             <a:fld id="{6FD62889-B4F9-4BAB-9203-1DBCFD1C949F}" type="datetimeFigureOut">
               <a:rPr lang="en-CA" smtClean="0"/>
-              <a:t>2024-01-25</a:t>
+              <a:t>2024-02-01</a:t>
             </a:fld>
             <a:endParaRPr lang="en-CA"/>
           </a:p>
@@ -3186,7 +3186,7 @@
           <a:p>
             <a:fld id="{6FD62889-B4F9-4BAB-9203-1DBCFD1C949F}" type="datetimeFigureOut">
               <a:rPr lang="en-CA" smtClean="0"/>
-              <a:t>2024-01-25</a:t>
+              <a:t>2024-02-01</a:t>
             </a:fld>
             <a:endParaRPr lang="en-CA"/>
           </a:p>
@@ -3605,225 +3605,53 @@
       </p:grpSpPr>
       <p:sp>
         <p:nvSpPr>
-          <p:cNvPr id="4" name="Rectangle: Rounded Corners 3">
-            <a:extLst>
-              <a:ext uri="{FF2B5EF4-FFF2-40B4-BE49-F238E27FC236}">
-                <a16:creationId xmlns:a16="http://schemas.microsoft.com/office/drawing/2014/main" id="{9979CD26-5D33-1713-6AE3-E266F8DE4EF0}"/>
-              </a:ext>
-            </a:extLst>
-          </p:cNvPr>
-          <p:cNvSpPr/>
-          <p:nvPr/>
-        </p:nvSpPr>
-        <p:spPr>
-          <a:xfrm>
-            <a:off x="576943" y="1926771"/>
-            <a:ext cx="2819400" cy="1719943"/>
-          </a:xfrm>
-          <a:prstGeom prst="roundRect">
-            <a:avLst/>
-          </a:prstGeom>
-        </p:spPr>
-        <p:style>
-          <a:lnRef idx="2">
-            <a:schemeClr val="accent1">
-              <a:shade val="50000"/>
-            </a:schemeClr>
-          </a:lnRef>
-          <a:fillRef idx="1">
-            <a:schemeClr val="accent1"/>
-          </a:fillRef>
-          <a:effectRef idx="0">
-            <a:schemeClr val="accent1"/>
-          </a:effectRef>
-          <a:fontRef idx="minor">
-            <a:schemeClr val="lt1"/>
-          </a:fontRef>
-        </p:style>
-        <p:txBody>
-          <a:bodyPr rtlCol="0" anchor="ctr"/>
-          <a:lstStyle/>
-          <a:p>
-            <a:pPr algn="ctr"/>
+          <p:cNvPr id="2" name="Title 1">
+            <a:extLst>
+              <a:ext uri="{FF2B5EF4-FFF2-40B4-BE49-F238E27FC236}">
+                <a16:creationId xmlns:a16="http://schemas.microsoft.com/office/drawing/2014/main" id="{EAC09FC5-03B0-2A09-2AC0-D5956157E4EE}"/>
+              </a:ext>
+            </a:extLst>
+          </p:cNvPr>
+          <p:cNvSpPr>
+            <a:spLocks noGrp="1"/>
+          </p:cNvSpPr>
+          <p:nvPr>
+            <p:ph type="title"/>
+          </p:nvPr>
+        </p:nvSpPr>
+        <p:spPr/>
+        <p:txBody>
+          <a:bodyPr/>
+          <a:lstStyle/>
+          <a:p>
             <a:r>
               <a:rPr lang="en-CA" dirty="0"/>
-              <a:t>OpenGL</a:t>
-            </a:r>
-          </a:p>
-        </p:txBody>
-      </p:sp>
-      <p:sp>
-        <p:nvSpPr>
-          <p:cNvPr id="5" name="Rectangle 4">
-            <a:extLst>
-              <a:ext uri="{FF2B5EF4-FFF2-40B4-BE49-F238E27FC236}">
-                <a16:creationId xmlns:a16="http://schemas.microsoft.com/office/drawing/2014/main" id="{3E7C39FD-0879-82C0-AEBB-0AF6AE49EABF}"/>
-              </a:ext>
-            </a:extLst>
-          </p:cNvPr>
-          <p:cNvSpPr/>
-          <p:nvPr/>
-        </p:nvSpPr>
-        <p:spPr>
-          <a:xfrm>
-            <a:off x="5758543" y="936171"/>
-            <a:ext cx="4887686" cy="1981200"/>
-          </a:xfrm>
-          <a:prstGeom prst="rect">
-            <a:avLst/>
-          </a:prstGeom>
-        </p:spPr>
-        <p:style>
-          <a:lnRef idx="2">
-            <a:schemeClr val="accent1">
-              <a:shade val="50000"/>
-            </a:schemeClr>
-          </a:lnRef>
-          <a:fillRef idx="1">
-            <a:schemeClr val="accent1"/>
-          </a:fillRef>
-          <a:effectRef idx="0">
-            <a:schemeClr val="accent1"/>
-          </a:effectRef>
-          <a:fontRef idx="minor">
-            <a:schemeClr val="lt1"/>
-          </a:fontRef>
-        </p:style>
-        <p:txBody>
-          <a:bodyPr rtlCol="0" anchor="ctr"/>
-          <a:lstStyle/>
-          <a:p>
-            <a:pPr algn="ctr"/>
-            <a:r>
-              <a:rPr lang="en-CA" sz="2800" dirty="0"/>
-              <a:t>Color buffer (2D Array)</a:t>
-            </a:r>
-          </a:p>
-          <a:p>
-            <a:pPr algn="ctr"/>
-            <a:r>
-              <a:rPr lang="en-CA" sz="2800" dirty="0"/>
-              <a:t>RGBA8</a:t>
-            </a:r>
-          </a:p>
-          <a:p>
-            <a:pPr algn="ctr"/>
-            <a:r>
-              <a:rPr lang="en-CA" sz="2800" dirty="0"/>
-              <a:t>(8 bits/pixel = 32 bits)</a:t>
-            </a:r>
-          </a:p>
-        </p:txBody>
-      </p:sp>
-      <p:sp>
-        <p:nvSpPr>
-          <p:cNvPr id="6" name="Rectangle 5">
-            <a:extLst>
-              <a:ext uri="{FF2B5EF4-FFF2-40B4-BE49-F238E27FC236}">
-                <a16:creationId xmlns:a16="http://schemas.microsoft.com/office/drawing/2014/main" id="{E71148E5-0E11-428D-E0D4-1AA290C46801}"/>
-              </a:ext>
-            </a:extLst>
-          </p:cNvPr>
-          <p:cNvSpPr/>
-          <p:nvPr/>
-        </p:nvSpPr>
-        <p:spPr>
-          <a:xfrm>
-            <a:off x="5758543" y="3113314"/>
-            <a:ext cx="4887686" cy="1981200"/>
-          </a:xfrm>
-          <a:prstGeom prst="rect">
-            <a:avLst/>
-          </a:prstGeom>
-        </p:spPr>
-        <p:style>
-          <a:lnRef idx="2">
-            <a:schemeClr val="accent1">
-              <a:shade val="50000"/>
-            </a:schemeClr>
-          </a:lnRef>
-          <a:fillRef idx="1">
-            <a:schemeClr val="accent1"/>
-          </a:fillRef>
-          <a:effectRef idx="0">
-            <a:schemeClr val="accent1"/>
-          </a:effectRef>
-          <a:fontRef idx="minor">
-            <a:schemeClr val="lt1"/>
-          </a:fontRef>
-        </p:style>
-        <p:txBody>
-          <a:bodyPr rtlCol="0" anchor="ctr"/>
-          <a:lstStyle/>
-          <a:p>
-            <a:pPr algn="ctr"/>
-            <a:r>
-              <a:rPr lang="en-CA" sz="2800" b="1" dirty="0"/>
-              <a:t>Depth buffer </a:t>
-            </a:r>
-            <a:r>
-              <a:rPr lang="en-CA" sz="2800" dirty="0"/>
-              <a:t>(2D Array)</a:t>
-            </a:r>
-          </a:p>
-          <a:p>
-            <a:pPr algn="ctr"/>
-            <a:r>
-              <a:rPr lang="en-CA" sz="2800" dirty="0"/>
-              <a:t>(common depth = 24 bits)</a:t>
-            </a:r>
-          </a:p>
-          <a:p>
-            <a:pPr algn="ctr"/>
-            <a:r>
-              <a:rPr lang="en-CA" sz="2800" dirty="0"/>
-              <a:t>(stencil = 8 bit)</a:t>
-            </a:r>
-          </a:p>
-        </p:txBody>
-      </p:sp>
-      <p:sp>
-        <p:nvSpPr>
-          <p:cNvPr id="7" name="Arrow: Right 6">
-            <a:extLst>
-              <a:ext uri="{FF2B5EF4-FFF2-40B4-BE49-F238E27FC236}">
-                <a16:creationId xmlns:a16="http://schemas.microsoft.com/office/drawing/2014/main" id="{E6B56AD9-14A0-BCC1-2712-A4DF28CE23F9}"/>
-              </a:ext>
-            </a:extLst>
-          </p:cNvPr>
-          <p:cNvSpPr/>
-          <p:nvPr/>
-        </p:nvSpPr>
-        <p:spPr>
-          <a:xfrm>
-            <a:off x="3548743" y="2307770"/>
-            <a:ext cx="2057400" cy="957943"/>
-          </a:xfrm>
-          <a:prstGeom prst="rightArrow">
-            <a:avLst/>
-          </a:prstGeom>
-        </p:spPr>
-        <p:style>
-          <a:lnRef idx="2">
-            <a:schemeClr val="accent1">
-              <a:shade val="50000"/>
-            </a:schemeClr>
-          </a:lnRef>
-          <a:fillRef idx="1">
-            <a:schemeClr val="accent1"/>
-          </a:fillRef>
-          <a:effectRef idx="0">
-            <a:schemeClr val="accent1"/>
-          </a:effectRef>
-          <a:fontRef idx="minor">
-            <a:schemeClr val="lt1"/>
-          </a:fontRef>
-        </p:style>
-        <p:txBody>
-          <a:bodyPr rtlCol="0" anchor="ctr"/>
-          <a:lstStyle/>
-          <a:p>
-            <a:pPr algn="ctr"/>
+              <a:t>Deferred rendering, part 1</a:t>
+            </a:r>
+          </a:p>
+        </p:txBody>
+      </p:sp>
+      <p:sp>
+        <p:nvSpPr>
+          <p:cNvPr id="3" name="Content Placeholder 2">
+            <a:extLst>
+              <a:ext uri="{FF2B5EF4-FFF2-40B4-BE49-F238E27FC236}">
+                <a16:creationId xmlns:a16="http://schemas.microsoft.com/office/drawing/2014/main" id="{7FB86B85-681D-7476-1EB9-CBB998624231}"/>
+              </a:ext>
+            </a:extLst>
+          </p:cNvPr>
+          <p:cNvSpPr>
+            <a:spLocks noGrp="1"/>
+          </p:cNvSpPr>
+          <p:nvPr>
+            <p:ph idx="1"/>
+          </p:nvPr>
+        </p:nvSpPr>
+        <p:spPr/>
+        <p:txBody>
+          <a:bodyPr/>
+          <a:lstStyle/>
+          <a:p>
             <a:endParaRPr lang="en-CA"/>
           </a:p>
         </p:txBody>
@@ -3831,7 +3659,7 @@
     </p:spTree>
     <p:extLst>
       <p:ext uri="{BB962C8B-B14F-4D97-AF65-F5344CB8AC3E}">
-        <p14:creationId xmlns:p14="http://schemas.microsoft.com/office/powerpoint/2010/main" val="1543766803"/>
+        <p14:creationId xmlns:p14="http://schemas.microsoft.com/office/powerpoint/2010/main" val="4082576145"/>
       </p:ext>
     </p:extLst>
   </p:cSld>

</xml_diff>